<commit_message>
V 2020 04 27 100 slides
</commit_message>
<xml_diff>
--- a/CSharpQuickReferencia.pptx
+++ b/CSharpQuickReferencia.pptx
@@ -105,9 +105,9 @@
     <p:sldId id="354" r:id="rId96"/>
     <p:sldId id="355" r:id="rId97"/>
     <p:sldId id="356" r:id="rId98"/>
-    <p:sldId id="357" r:id="rId99"/>
-    <p:sldId id="358" r:id="rId100"/>
-    <p:sldId id="359" r:id="rId101"/>
+    <p:sldId id="358" r:id="rId99"/>
+    <p:sldId id="359" r:id="rId100"/>
+    <p:sldId id="360" r:id="rId101"/>
   </p:sldIdLst>
   <p:sldSz cx="12192000" cy="6858000"/>
   <p:notesSz cx="6858000" cy="9144000"/>
@@ -308,9 +308,9 @@
             <p14:sldId id="354"/>
             <p14:sldId id="355"/>
             <p14:sldId id="356"/>
-            <p14:sldId id="357"/>
             <p14:sldId id="358"/>
             <p14:sldId id="359"/>
+            <p14:sldId id="360"/>
           </p14:sldIdLst>
         </p14:section>
       </p14:sectionLst>
@@ -404,7 +404,7 @@
           <a:p>
             <a:fld id="{62B1E310-8366-2740-B701-834CA158AAE3}" type="datetimeFigureOut">
               <a:rPr lang="en-BO" smtClean="0"/>
-              <a:t>4/26/20</a:t>
+              <a:t>4/28/20</a:t>
             </a:fld>
             <a:endParaRPr lang="en-BO"/>
           </a:p>
@@ -800,10 +800,7 @@
           <a:bodyPr/>
           <a:lstStyle/>
           <a:p>
-            <a:r>
-              <a:rPr lang="en-BO" dirty="0"/>
-              <a:t>Probar entrar a elemento de tipo string[] no asignado</a:t>
-            </a:r>
+            <a:endParaRPr lang="en-BO" dirty="0"/>
           </a:p>
         </p:txBody>
       </p:sp>
@@ -824,7 +821,7 @@
           <a:p>
             <a:fld id="{38D62FAD-41FB-114C-973F-4611EED3A6D2}" type="slidenum">
               <a:rPr lang="en-BO" smtClean="0"/>
-              <a:t>56</a:t>
+              <a:t>53</a:t>
             </a:fld>
             <a:endParaRPr lang="en-BO"/>
           </a:p>
@@ -833,7 +830,7 @@
     </p:spTree>
     <p:extLst>
       <p:ext uri="{BB962C8B-B14F-4D97-AF65-F5344CB8AC3E}">
-        <p14:creationId xmlns:p14="http://schemas.microsoft.com/office/powerpoint/2010/main" val="500555713"/>
+        <p14:creationId xmlns:p14="http://schemas.microsoft.com/office/powerpoint/2010/main" val="357365192"/>
       </p:ext>
     </p:extLst>
   </p:cSld>
@@ -887,7 +884,10 @@
           <a:bodyPr/>
           <a:lstStyle/>
           <a:p>
-            <a:endParaRPr lang="en-BO" dirty="0"/>
+            <a:r>
+              <a:rPr lang="en-BO" dirty="0"/>
+              <a:t>Probar entrar a elemento de tipo string[] no asignado</a:t>
+            </a:r>
           </a:p>
         </p:txBody>
       </p:sp>
@@ -908,7 +908,7 @@
           <a:p>
             <a:fld id="{38D62FAD-41FB-114C-973F-4611EED3A6D2}" type="slidenum">
               <a:rPr lang="en-BO" smtClean="0"/>
-              <a:t>58</a:t>
+              <a:t>56</a:t>
             </a:fld>
             <a:endParaRPr lang="en-BO"/>
           </a:p>
@@ -917,7 +917,7 @@
     </p:spTree>
     <p:extLst>
       <p:ext uri="{BB962C8B-B14F-4D97-AF65-F5344CB8AC3E}">
-        <p14:creationId xmlns:p14="http://schemas.microsoft.com/office/powerpoint/2010/main" val="1370801696"/>
+        <p14:creationId xmlns:p14="http://schemas.microsoft.com/office/powerpoint/2010/main" val="500555713"/>
       </p:ext>
     </p:extLst>
   </p:cSld>
@@ -992,7 +992,7 @@
           <a:p>
             <a:fld id="{38D62FAD-41FB-114C-973F-4611EED3A6D2}" type="slidenum">
               <a:rPr lang="en-BO" smtClean="0"/>
-              <a:t>64</a:t>
+              <a:t>58</a:t>
             </a:fld>
             <a:endParaRPr lang="en-BO"/>
           </a:p>
@@ -1001,7 +1001,7 @@
     </p:spTree>
     <p:extLst>
       <p:ext uri="{BB962C8B-B14F-4D97-AF65-F5344CB8AC3E}">
-        <p14:creationId xmlns:p14="http://schemas.microsoft.com/office/powerpoint/2010/main" val="2229978883"/>
+        <p14:creationId xmlns:p14="http://schemas.microsoft.com/office/powerpoint/2010/main" val="1370801696"/>
       </p:ext>
     </p:extLst>
   </p:cSld>
@@ -1076,7 +1076,7 @@
           <a:p>
             <a:fld id="{38D62FAD-41FB-114C-973F-4611EED3A6D2}" type="slidenum">
               <a:rPr lang="en-BO" smtClean="0"/>
-              <a:t>65</a:t>
+              <a:t>64</a:t>
             </a:fld>
             <a:endParaRPr lang="en-BO"/>
           </a:p>
@@ -1085,7 +1085,7 @@
     </p:spTree>
     <p:extLst>
       <p:ext uri="{BB962C8B-B14F-4D97-AF65-F5344CB8AC3E}">
-        <p14:creationId xmlns:p14="http://schemas.microsoft.com/office/powerpoint/2010/main" val="432347575"/>
+        <p14:creationId xmlns:p14="http://schemas.microsoft.com/office/powerpoint/2010/main" val="2229978883"/>
       </p:ext>
     </p:extLst>
   </p:cSld>
@@ -1160,7 +1160,7 @@
           <a:p>
             <a:fld id="{38D62FAD-41FB-114C-973F-4611EED3A6D2}" type="slidenum">
               <a:rPr lang="en-BO" smtClean="0"/>
-              <a:t>67</a:t>
+              <a:t>65</a:t>
             </a:fld>
             <a:endParaRPr lang="en-BO"/>
           </a:p>
@@ -1169,7 +1169,7 @@
     </p:spTree>
     <p:extLst>
       <p:ext uri="{BB962C8B-B14F-4D97-AF65-F5344CB8AC3E}">
-        <p14:creationId xmlns:p14="http://schemas.microsoft.com/office/powerpoint/2010/main" val="22779694"/>
+        <p14:creationId xmlns:p14="http://schemas.microsoft.com/office/powerpoint/2010/main" val="432347575"/>
       </p:ext>
     </p:extLst>
   </p:cSld>
@@ -1244,7 +1244,7 @@
           <a:p>
             <a:fld id="{38D62FAD-41FB-114C-973F-4611EED3A6D2}" type="slidenum">
               <a:rPr lang="en-BO" smtClean="0"/>
-              <a:t>69</a:t>
+              <a:t>67</a:t>
             </a:fld>
             <a:endParaRPr lang="en-BO"/>
           </a:p>
@@ -1253,7 +1253,7 @@
     </p:spTree>
     <p:extLst>
       <p:ext uri="{BB962C8B-B14F-4D97-AF65-F5344CB8AC3E}">
-        <p14:creationId xmlns:p14="http://schemas.microsoft.com/office/powerpoint/2010/main" val="1460942465"/>
+        <p14:creationId xmlns:p14="http://schemas.microsoft.com/office/powerpoint/2010/main" val="22779694"/>
       </p:ext>
     </p:extLst>
   </p:cSld>
@@ -1328,7 +1328,7 @@
           <a:p>
             <a:fld id="{38D62FAD-41FB-114C-973F-4611EED3A6D2}" type="slidenum">
               <a:rPr lang="en-BO" smtClean="0"/>
-              <a:t>70</a:t>
+              <a:t>69</a:t>
             </a:fld>
             <a:endParaRPr lang="en-BO"/>
           </a:p>
@@ -1337,7 +1337,7 @@
     </p:spTree>
     <p:extLst>
       <p:ext uri="{BB962C8B-B14F-4D97-AF65-F5344CB8AC3E}">
-        <p14:creationId xmlns:p14="http://schemas.microsoft.com/office/powerpoint/2010/main" val="3772429236"/>
+        <p14:creationId xmlns:p14="http://schemas.microsoft.com/office/powerpoint/2010/main" val="1460942465"/>
       </p:ext>
     </p:extLst>
   </p:cSld>
@@ -1412,7 +1412,7 @@
           <a:p>
             <a:fld id="{38D62FAD-41FB-114C-973F-4611EED3A6D2}" type="slidenum">
               <a:rPr lang="en-BO" smtClean="0"/>
-              <a:t>71</a:t>
+              <a:t>70</a:t>
             </a:fld>
             <a:endParaRPr lang="en-BO"/>
           </a:p>
@@ -1421,7 +1421,7 @@
     </p:spTree>
     <p:extLst>
       <p:ext uri="{BB962C8B-B14F-4D97-AF65-F5344CB8AC3E}">
-        <p14:creationId xmlns:p14="http://schemas.microsoft.com/office/powerpoint/2010/main" val="2764778246"/>
+        <p14:creationId xmlns:p14="http://schemas.microsoft.com/office/powerpoint/2010/main" val="3772429236"/>
       </p:ext>
     </p:extLst>
   </p:cSld>
@@ -1496,7 +1496,7 @@
           <a:p>
             <a:fld id="{38D62FAD-41FB-114C-973F-4611EED3A6D2}" type="slidenum">
               <a:rPr lang="en-BO" smtClean="0"/>
-              <a:t>74</a:t>
+              <a:t>71</a:t>
             </a:fld>
             <a:endParaRPr lang="en-BO"/>
           </a:p>
@@ -1505,7 +1505,7 @@
     </p:spTree>
     <p:extLst>
       <p:ext uri="{BB962C8B-B14F-4D97-AF65-F5344CB8AC3E}">
-        <p14:creationId xmlns:p14="http://schemas.microsoft.com/office/powerpoint/2010/main" val="3026122967"/>
+        <p14:creationId xmlns:p14="http://schemas.microsoft.com/office/powerpoint/2010/main" val="2764778246"/>
       </p:ext>
     </p:extLst>
   </p:cSld>
@@ -1580,7 +1580,7 @@
           <a:p>
             <a:fld id="{38D62FAD-41FB-114C-973F-4611EED3A6D2}" type="slidenum">
               <a:rPr lang="en-BO" smtClean="0"/>
-              <a:t>89</a:t>
+              <a:t>74</a:t>
             </a:fld>
             <a:endParaRPr lang="en-BO"/>
           </a:p>
@@ -1589,7 +1589,7 @@
     </p:spTree>
     <p:extLst>
       <p:ext uri="{BB962C8B-B14F-4D97-AF65-F5344CB8AC3E}">
-        <p14:creationId xmlns:p14="http://schemas.microsoft.com/office/powerpoint/2010/main" val="2216449808"/>
+        <p14:creationId xmlns:p14="http://schemas.microsoft.com/office/powerpoint/2010/main" val="3026122967"/>
       </p:ext>
     </p:extLst>
   </p:cSld>
@@ -1727,6 +1727,90 @@
           <a:bodyPr/>
           <a:lstStyle/>
           <a:p>
+            <a:endParaRPr lang="en-BO" dirty="0"/>
+          </a:p>
+        </p:txBody>
+      </p:sp>
+      <p:sp>
+        <p:nvSpPr>
+          <p:cNvPr id="4" name="Slide Number Placeholder 3"/>
+          <p:cNvSpPr>
+            <a:spLocks noGrp="1"/>
+          </p:cNvSpPr>
+          <p:nvPr>
+            <p:ph type="sldNum" sz="quarter" idx="5"/>
+          </p:nvPr>
+        </p:nvSpPr>
+        <p:spPr/>
+        <p:txBody>
+          <a:bodyPr/>
+          <a:lstStyle/>
+          <a:p>
+            <a:fld id="{38D62FAD-41FB-114C-973F-4611EED3A6D2}" type="slidenum">
+              <a:rPr lang="en-BO" smtClean="0"/>
+              <a:t>89</a:t>
+            </a:fld>
+            <a:endParaRPr lang="en-BO"/>
+          </a:p>
+        </p:txBody>
+      </p:sp>
+    </p:spTree>
+    <p:extLst>
+      <p:ext uri="{BB962C8B-B14F-4D97-AF65-F5344CB8AC3E}">
+        <p14:creationId xmlns:p14="http://schemas.microsoft.com/office/powerpoint/2010/main" val="2216449808"/>
+      </p:ext>
+    </p:extLst>
+  </p:cSld>
+  <p:clrMapOvr>
+    <a:masterClrMapping/>
+  </p:clrMapOvr>
+</p:notes>
+</file>
+
+<file path=ppt/notesSlides/notesSlide21.xml><?xml version="1.0" encoding="utf-8"?>
+<p:notes xmlns:a="http://schemas.openxmlformats.org/drawingml/2006/main" xmlns:r="http://schemas.openxmlformats.org/officeDocument/2006/relationships" xmlns:p="http://schemas.openxmlformats.org/presentationml/2006/main">
+  <p:cSld>
+    <p:spTree>
+      <p:nvGrpSpPr>
+        <p:cNvPr id="1" name=""/>
+        <p:cNvGrpSpPr/>
+        <p:nvPr/>
+      </p:nvGrpSpPr>
+      <p:grpSpPr>
+        <a:xfrm>
+          <a:off x="0" y="0"/>
+          <a:ext cx="0" cy="0"/>
+          <a:chOff x="0" y="0"/>
+          <a:chExt cx="0" cy="0"/>
+        </a:xfrm>
+      </p:grpSpPr>
+      <p:sp>
+        <p:nvSpPr>
+          <p:cNvPr id="2" name="Slide Image Placeholder 1"/>
+          <p:cNvSpPr>
+            <a:spLocks noGrp="1" noRot="1" noChangeAspect="1"/>
+          </p:cNvSpPr>
+          <p:nvPr>
+            <p:ph type="sldImg"/>
+          </p:nvPr>
+        </p:nvSpPr>
+        <p:spPr/>
+      </p:sp>
+      <p:sp>
+        <p:nvSpPr>
+          <p:cNvPr id="3" name="Notes Placeholder 2"/>
+          <p:cNvSpPr>
+            <a:spLocks noGrp="1"/>
+          </p:cNvSpPr>
+          <p:nvPr>
+            <p:ph type="body" idx="1"/>
+          </p:nvPr>
+        </p:nvSpPr>
+        <p:spPr/>
+        <p:txBody>
+          <a:bodyPr/>
+          <a:lstStyle/>
+          <a:p>
             <a:r>
               <a:rPr lang="en-US" dirty="0"/>
               <a:t>N</a:t>
@@ -2248,10 +2332,7 @@
           <a:bodyPr/>
           <a:lstStyle/>
           <a:p>
-            <a:r>
-              <a:rPr lang="en-BO" dirty="0"/>
-              <a:t>Pendiente StringBuilder</a:t>
-            </a:r>
+            <a:endParaRPr lang="en-BO" dirty="0"/>
           </a:p>
         </p:txBody>
       </p:sp>
@@ -2272,7 +2353,7 @@
           <a:p>
             <a:fld id="{38D62FAD-41FB-114C-973F-4611EED3A6D2}" type="slidenum">
               <a:rPr lang="en-BO" smtClean="0"/>
-              <a:t>51</a:t>
+              <a:t>42</a:t>
             </a:fld>
             <a:endParaRPr lang="en-BO"/>
           </a:p>
@@ -2281,7 +2362,7 @@
     </p:spTree>
     <p:extLst>
       <p:ext uri="{BB962C8B-B14F-4D97-AF65-F5344CB8AC3E}">
-        <p14:creationId xmlns:p14="http://schemas.microsoft.com/office/powerpoint/2010/main" val="1102791808"/>
+        <p14:creationId xmlns:p14="http://schemas.microsoft.com/office/powerpoint/2010/main" val="725812578"/>
       </p:ext>
     </p:extLst>
   </p:cSld>
@@ -2335,7 +2416,10 @@
           <a:bodyPr/>
           <a:lstStyle/>
           <a:p>
-            <a:endParaRPr lang="en-BO" dirty="0"/>
+            <a:r>
+              <a:rPr lang="en-BO" dirty="0"/>
+              <a:t>Pendiente StringBuilder</a:t>
+            </a:r>
           </a:p>
         </p:txBody>
       </p:sp>
@@ -2356,7 +2440,7 @@
           <a:p>
             <a:fld id="{38D62FAD-41FB-114C-973F-4611EED3A6D2}" type="slidenum">
               <a:rPr lang="en-BO" smtClean="0"/>
-              <a:t>53</a:t>
+              <a:t>51</a:t>
             </a:fld>
             <a:endParaRPr lang="en-BO"/>
           </a:p>
@@ -2365,7 +2449,7 @@
     </p:spTree>
     <p:extLst>
       <p:ext uri="{BB962C8B-B14F-4D97-AF65-F5344CB8AC3E}">
-        <p14:creationId xmlns:p14="http://schemas.microsoft.com/office/powerpoint/2010/main" val="357365192"/>
+        <p14:creationId xmlns:p14="http://schemas.microsoft.com/office/powerpoint/2010/main" val="1102791808"/>
       </p:ext>
     </p:extLst>
   </p:cSld>
@@ -2524,7 +2608,7 @@
           <a:p>
             <a:fld id="{2D504DAD-788E-6544-B152-D66250FE087A}" type="datetimeFigureOut">
               <a:rPr lang="en-BO" smtClean="0"/>
-              <a:t>4/26/20</a:t>
+              <a:t>4/28/20</a:t>
             </a:fld>
             <a:endParaRPr lang="en-BO"/>
           </a:p>
@@ -2724,7 +2808,7 @@
           <a:p>
             <a:fld id="{2D504DAD-788E-6544-B152-D66250FE087A}" type="datetimeFigureOut">
               <a:rPr lang="en-BO" smtClean="0"/>
-              <a:t>4/26/20</a:t>
+              <a:t>4/28/20</a:t>
             </a:fld>
             <a:endParaRPr lang="en-BO"/>
           </a:p>
@@ -2934,7 +3018,7 @@
           <a:p>
             <a:fld id="{2D504DAD-788E-6544-B152-D66250FE087A}" type="datetimeFigureOut">
               <a:rPr lang="en-BO" smtClean="0"/>
-              <a:t>4/26/20</a:t>
+              <a:t>4/28/20</a:t>
             </a:fld>
             <a:endParaRPr lang="en-BO"/>
           </a:p>
@@ -3134,7 +3218,7 @@
           <a:p>
             <a:fld id="{2D504DAD-788E-6544-B152-D66250FE087A}" type="datetimeFigureOut">
               <a:rPr lang="en-BO" smtClean="0"/>
-              <a:t>4/26/20</a:t>
+              <a:t>4/28/20</a:t>
             </a:fld>
             <a:endParaRPr lang="en-BO"/>
           </a:p>
@@ -3410,7 +3494,7 @@
           <a:p>
             <a:fld id="{2D504DAD-788E-6544-B152-D66250FE087A}" type="datetimeFigureOut">
               <a:rPr lang="en-BO" smtClean="0"/>
-              <a:t>4/26/20</a:t>
+              <a:t>4/28/20</a:t>
             </a:fld>
             <a:endParaRPr lang="en-BO"/>
           </a:p>
@@ -3678,7 +3762,7 @@
           <a:p>
             <a:fld id="{2D504DAD-788E-6544-B152-D66250FE087A}" type="datetimeFigureOut">
               <a:rPr lang="en-BO" smtClean="0"/>
-              <a:t>4/26/20</a:t>
+              <a:t>4/28/20</a:t>
             </a:fld>
             <a:endParaRPr lang="en-BO"/>
           </a:p>
@@ -4093,7 +4177,7 @@
           <a:p>
             <a:fld id="{2D504DAD-788E-6544-B152-D66250FE087A}" type="datetimeFigureOut">
               <a:rPr lang="en-BO" smtClean="0"/>
-              <a:t>4/26/20</a:t>
+              <a:t>4/28/20</a:t>
             </a:fld>
             <a:endParaRPr lang="en-BO"/>
           </a:p>
@@ -4235,7 +4319,7 @@
           <a:p>
             <a:fld id="{2D504DAD-788E-6544-B152-D66250FE087A}" type="datetimeFigureOut">
               <a:rPr lang="en-BO" smtClean="0"/>
-              <a:t>4/26/20</a:t>
+              <a:t>4/28/20</a:t>
             </a:fld>
             <a:endParaRPr lang="en-BO"/>
           </a:p>
@@ -4348,7 +4432,7 @@
           <a:p>
             <a:fld id="{2D504DAD-788E-6544-B152-D66250FE087A}" type="datetimeFigureOut">
               <a:rPr lang="en-BO" smtClean="0"/>
-              <a:t>4/26/20</a:t>
+              <a:t>4/28/20</a:t>
             </a:fld>
             <a:endParaRPr lang="en-BO"/>
           </a:p>
@@ -4661,7 +4745,7 @@
           <a:p>
             <a:fld id="{2D504DAD-788E-6544-B152-D66250FE087A}" type="datetimeFigureOut">
               <a:rPr lang="en-BO" smtClean="0"/>
-              <a:t>4/26/20</a:t>
+              <a:t>4/28/20</a:t>
             </a:fld>
             <a:endParaRPr lang="en-BO"/>
           </a:p>
@@ -4950,7 +5034,7 @@
           <a:p>
             <a:fld id="{2D504DAD-788E-6544-B152-D66250FE087A}" type="datetimeFigureOut">
               <a:rPr lang="en-BO" smtClean="0"/>
-              <a:t>4/26/20</a:t>
+              <a:t>4/28/20</a:t>
             </a:fld>
             <a:endParaRPr lang="en-BO"/>
           </a:p>
@@ -5193,7 +5277,7 @@
           <a:p>
             <a:fld id="{2D504DAD-788E-6544-B152-D66250FE087A}" type="datetimeFigureOut">
               <a:rPr lang="en-BO" smtClean="0"/>
-              <a:t>4/26/20</a:t>
+              <a:t>4/28/20</a:t>
             </a:fld>
             <a:endParaRPr lang="en-BO"/>
           </a:p>
@@ -6306,7 +6390,7 @@
           <p:cNvPr id="2" name="Title 1">
             <a:extLst>
               <a:ext uri="{FF2B5EF4-FFF2-40B4-BE49-F238E27FC236}">
-                <a16:creationId xmlns:a16="http://schemas.microsoft.com/office/drawing/2014/main" id="{75F394D0-A645-C446-A07D-8022F1152D16}"/>
+                <a16:creationId xmlns:a16="http://schemas.microsoft.com/office/drawing/2014/main" id="{40B005A9-FF5C-C64E-BC1D-6F7A6B7B02EF}"/>
               </a:ext>
             </a:extLst>
           </p:cNvPr>
@@ -6319,16 +6403,13 @@
         </p:nvSpPr>
         <p:spPr/>
         <p:txBody>
-          <a:bodyPr>
-            <a:normAutofit/>
-          </a:bodyPr>
+          <a:bodyPr/>
           <a:lstStyle/>
           <a:p>
             <a:r>
-              <a:rPr lang="en-BO" sz="4000" dirty="0"/>
-              <a:t>Declarando la variable out en el método invocado</a:t>
-            </a:r>
-            <a:endParaRPr lang="en-BO" sz="4800" dirty="0"/>
+              <a:rPr lang="en-BO" dirty="0"/>
+              <a:t>Métodos locales</a:t>
+            </a:r>
           </a:p>
         </p:txBody>
       </p:sp>
@@ -6337,7 +6418,7 @@
           <p:cNvPr id="3" name="Content Placeholder 2">
             <a:extLst>
               <a:ext uri="{FF2B5EF4-FFF2-40B4-BE49-F238E27FC236}">
-                <a16:creationId xmlns:a16="http://schemas.microsoft.com/office/drawing/2014/main" id="{7455A23F-1C34-8341-8BF7-6AA34E8A54CF}"/>
+                <a16:creationId xmlns:a16="http://schemas.microsoft.com/office/drawing/2014/main" id="{FFCFFEB8-6387-2341-A38F-11A41E862865}"/>
               </a:ext>
             </a:extLst>
           </p:cNvPr>
@@ -6348,19 +6429,585 @@
             <p:ph idx="1"/>
           </p:nvPr>
         </p:nvSpPr>
-        <p:spPr/>
+        <p:spPr>
+          <a:xfrm>
+            <a:off x="6966857" y="2192811"/>
+            <a:ext cx="4386943" cy="3808821"/>
+          </a:xfrm>
+        </p:spPr>
+        <p:style>
+          <a:lnRef idx="1">
+            <a:schemeClr val="accent5"/>
+          </a:lnRef>
+          <a:fillRef idx="2">
+            <a:schemeClr val="accent5"/>
+          </a:fillRef>
+          <a:effectRef idx="1">
+            <a:schemeClr val="accent5"/>
+          </a:effectRef>
+          <a:fontRef idx="minor">
+            <a:schemeClr val="dk1"/>
+          </a:fontRef>
+        </p:style>
         <p:txBody>
-          <a:bodyPr/>
+          <a:bodyPr>
+            <a:normAutofit fontScale="85000" lnSpcReduction="10000"/>
+          </a:bodyPr>
           <a:lstStyle/>
           <a:p>
+            <a:pPr marL="0" indent="0">
+              <a:buNone/>
+            </a:pPr>
+            <a:r>
+              <a:rPr lang="en-US" dirty="0"/>
+              <a:t>Un </a:t>
+            </a:r>
+            <a:r>
+              <a:rPr lang="en-US" dirty="0" err="1"/>
+              <a:t>método</a:t>
+            </a:r>
+            <a:r>
+              <a:rPr lang="en-US" dirty="0"/>
+              <a:t> local es un </a:t>
+            </a:r>
+            <a:r>
+              <a:rPr lang="en-US" dirty="0" err="1"/>
+              <a:t>método</a:t>
+            </a:r>
+            <a:r>
+              <a:rPr lang="en-US" dirty="0"/>
+              <a:t> que se define dentro de </a:t>
+            </a:r>
+            <a:r>
+              <a:rPr lang="en-US" dirty="0" err="1"/>
+              <a:t>otro</a:t>
+            </a:r>
+            <a:r>
+              <a:rPr lang="en-US" dirty="0"/>
+              <a:t> </a:t>
+            </a:r>
+            <a:r>
+              <a:rPr lang="en-US" dirty="0" err="1"/>
+              <a:t>método</a:t>
+            </a:r>
+            <a:r>
+              <a:rPr lang="en-US" dirty="0"/>
+              <a:t>. </a:t>
+            </a:r>
+            <a:r>
+              <a:rPr lang="en-US" dirty="0" err="1"/>
+              <a:t>Esto</a:t>
+            </a:r>
+            <a:r>
+              <a:rPr lang="en-US" dirty="0"/>
+              <a:t> es </a:t>
+            </a:r>
+            <a:r>
+              <a:rPr lang="en-US" dirty="0" err="1"/>
+              <a:t>útil</a:t>
+            </a:r>
+            <a:r>
+              <a:rPr lang="en-US" dirty="0"/>
+              <a:t> para </a:t>
+            </a:r>
+            <a:r>
+              <a:rPr lang="en-US" dirty="0" err="1"/>
+              <a:t>limitar</a:t>
+            </a:r>
+            <a:r>
+              <a:rPr lang="en-US" dirty="0"/>
+              <a:t> el </a:t>
+            </a:r>
+            <a:r>
+              <a:rPr lang="en-US" dirty="0" err="1"/>
+              <a:t>alcance</a:t>
+            </a:r>
+            <a:r>
+              <a:rPr lang="en-US" dirty="0"/>
+              <a:t> de un </a:t>
+            </a:r>
+            <a:r>
+              <a:rPr lang="en-US" dirty="0" err="1"/>
+              <a:t>método</a:t>
+            </a:r>
+            <a:r>
+              <a:rPr lang="en-US" dirty="0"/>
+              <a:t>, </a:t>
+            </a:r>
+            <a:r>
+              <a:rPr lang="en-US" dirty="0" err="1"/>
+              <a:t>en</a:t>
+            </a:r>
+            <a:r>
+              <a:rPr lang="en-US" dirty="0"/>
+              <a:t> los </a:t>
+            </a:r>
+            <a:r>
+              <a:rPr lang="en-US" dirty="0" err="1"/>
+              <a:t>casos</a:t>
+            </a:r>
+            <a:r>
+              <a:rPr lang="en-US" dirty="0"/>
+              <a:t> </a:t>
+            </a:r>
+            <a:r>
+              <a:rPr lang="en-US" dirty="0" err="1"/>
+              <a:t>en</a:t>
+            </a:r>
+            <a:r>
+              <a:rPr lang="en-US" dirty="0"/>
+              <a:t> que un </a:t>
+            </a:r>
+            <a:r>
+              <a:rPr lang="en-US" dirty="0" err="1"/>
+              <a:t>método</a:t>
+            </a:r>
+            <a:r>
+              <a:rPr lang="en-US" dirty="0"/>
+              <a:t> es solo </a:t>
+            </a:r>
+            <a:r>
+              <a:rPr lang="en-US" dirty="0" err="1"/>
+              <a:t>invocado</a:t>
+            </a:r>
+            <a:r>
+              <a:rPr lang="en-US" dirty="0"/>
+              <a:t> por </a:t>
+            </a:r>
+            <a:r>
+              <a:rPr lang="en-US" dirty="0" err="1"/>
+              <a:t>otro</a:t>
+            </a:r>
+            <a:r>
+              <a:rPr lang="en-US" dirty="0"/>
+              <a:t> </a:t>
+            </a:r>
+            <a:r>
+              <a:rPr lang="en-US" dirty="0" err="1"/>
+              <a:t>método</a:t>
+            </a:r>
+            <a:r>
+              <a:rPr lang="en-US" dirty="0"/>
+              <a:t>.</a:t>
+            </a:r>
+          </a:p>
+          <a:p>
+            <a:pPr marL="0" indent="0">
+              <a:buNone/>
+            </a:pPr>
+            <a:r>
+              <a:rPr lang="en-US" dirty="0"/>
+              <a:t>Para </a:t>
+            </a:r>
+            <a:r>
+              <a:rPr lang="en-US" dirty="0" err="1"/>
+              <a:t>ilustrar</a:t>
+            </a:r>
+            <a:r>
+              <a:rPr lang="en-US" dirty="0"/>
+              <a:t>, </a:t>
+            </a:r>
+            <a:r>
+              <a:rPr lang="en-US" dirty="0" err="1"/>
+              <a:t>aquí</a:t>
+            </a:r>
+            <a:r>
+              <a:rPr lang="en-US" dirty="0"/>
+              <a:t> se </a:t>
+            </a:r>
+            <a:r>
+              <a:rPr lang="en-US" dirty="0" err="1"/>
+              <a:t>usa</a:t>
+            </a:r>
+            <a:r>
+              <a:rPr lang="en-US" dirty="0"/>
+              <a:t> un </a:t>
+            </a:r>
+            <a:r>
+              <a:rPr lang="en-US" dirty="0" err="1"/>
+              <a:t>método</a:t>
+            </a:r>
+            <a:r>
+              <a:rPr lang="en-US" dirty="0"/>
+              <a:t> </a:t>
+            </a:r>
+            <a:r>
+              <a:rPr lang="en-US" dirty="0" err="1"/>
+              <a:t>anidado</a:t>
+            </a:r>
+            <a:r>
+              <a:rPr lang="en-US" dirty="0"/>
+              <a:t> para </a:t>
+            </a:r>
+            <a:r>
+              <a:rPr lang="en-US" dirty="0" err="1"/>
+              <a:t>realizar</a:t>
+            </a:r>
+            <a:r>
+              <a:rPr lang="en-US" dirty="0"/>
+              <a:t> una </a:t>
+            </a:r>
+            <a:r>
+              <a:rPr lang="en-US" dirty="0" err="1"/>
+              <a:t>cuenta</a:t>
+            </a:r>
+            <a:r>
+              <a:rPr lang="en-US" dirty="0"/>
+              <a:t> </a:t>
+            </a:r>
+            <a:r>
+              <a:rPr lang="en-US" dirty="0" err="1"/>
+              <a:t>regresiva</a:t>
+            </a:r>
+            <a:r>
+              <a:rPr lang="en-US" dirty="0"/>
+              <a:t>. El </a:t>
+            </a:r>
+            <a:r>
+              <a:rPr lang="en-US" dirty="0" err="1"/>
+              <a:t>método</a:t>
+            </a:r>
+            <a:r>
+              <a:rPr lang="en-US" dirty="0"/>
+              <a:t> </a:t>
+            </a:r>
+            <a:r>
+              <a:rPr lang="en-US" dirty="0" err="1"/>
+              <a:t>anidado</a:t>
+            </a:r>
+            <a:r>
+              <a:rPr lang="en-US" dirty="0"/>
+              <a:t> se llama a </a:t>
+            </a:r>
+            <a:r>
+              <a:rPr lang="en-US" dirty="0" err="1"/>
+              <a:t>sí</a:t>
+            </a:r>
+            <a:r>
+              <a:rPr lang="en-US" dirty="0"/>
+              <a:t> </a:t>
+            </a:r>
+            <a:r>
+              <a:rPr lang="en-US" dirty="0" err="1"/>
+              <a:t>mismo</a:t>
+            </a:r>
+            <a:r>
+              <a:rPr lang="en-US" dirty="0"/>
+              <a:t> y, por lo tanto, se lo </a:t>
+            </a:r>
+            <a:r>
+              <a:rPr lang="en-US" dirty="0" err="1"/>
+              <a:t>conoce</a:t>
+            </a:r>
+            <a:r>
+              <a:rPr lang="en-US" dirty="0"/>
+              <a:t> </a:t>
+            </a:r>
+            <a:r>
+              <a:rPr lang="en-US" dirty="0" err="1"/>
+              <a:t>como</a:t>
+            </a:r>
+            <a:r>
+              <a:rPr lang="en-US" dirty="0"/>
+              <a:t> un </a:t>
+            </a:r>
+            <a:r>
+              <a:rPr lang="en-US" dirty="0" err="1"/>
+              <a:t>método</a:t>
+            </a:r>
+            <a:r>
+              <a:rPr lang="en-US" dirty="0"/>
+              <a:t> </a:t>
+            </a:r>
+            <a:r>
+              <a:rPr lang="en-US" dirty="0" err="1"/>
+              <a:t>recursivo</a:t>
+            </a:r>
+            <a:r>
+              <a:rPr lang="en-US" dirty="0"/>
+              <a:t>.</a:t>
+            </a:r>
             <a:endParaRPr lang="en-BO" dirty="0"/>
+          </a:p>
+        </p:txBody>
+      </p:sp>
+      <p:sp>
+        <p:nvSpPr>
+          <p:cNvPr id="4" name="TextBox 3">
+            <a:extLst>
+              <a:ext uri="{FF2B5EF4-FFF2-40B4-BE49-F238E27FC236}">
+                <a16:creationId xmlns:a16="http://schemas.microsoft.com/office/drawing/2014/main" id="{4E2F2A01-0567-E145-B74B-59E484E1021B}"/>
+              </a:ext>
+            </a:extLst>
+          </p:cNvPr>
+          <p:cNvSpPr txBox="1"/>
+          <p:nvPr/>
+        </p:nvSpPr>
+        <p:spPr>
+          <a:xfrm>
+            <a:off x="838200" y="1988953"/>
+            <a:ext cx="5492933" cy="4216539"/>
+          </a:xfrm>
+          <a:prstGeom prst="rect">
+            <a:avLst/>
+          </a:prstGeom>
+        </p:spPr>
+        <p:style>
+          <a:lnRef idx="2">
+            <a:schemeClr val="accent1">
+              <a:shade val="50000"/>
+            </a:schemeClr>
+          </a:lnRef>
+          <a:fillRef idx="1">
+            <a:schemeClr val="accent1"/>
+          </a:fillRef>
+          <a:effectRef idx="0">
+            <a:schemeClr val="accent1"/>
+          </a:effectRef>
+          <a:fontRef idx="minor">
+            <a:schemeClr val="lt1"/>
+          </a:fontRef>
+        </p:style>
+        <p:txBody>
+          <a:bodyPr wrap="square" rtlCol="0">
+            <a:spAutoFit/>
+          </a:bodyPr>
+          <a:lstStyle/>
+          <a:p>
+            <a:r>
+              <a:rPr lang="en-US" sz="1000" dirty="0">
+                <a:solidFill>
+                  <a:schemeClr val="bg1">
+                    <a:lumMod val="85000"/>
+                  </a:schemeClr>
+                </a:solidFill>
+              </a:rPr>
+              <a:t>using System; using static </a:t>
+            </a:r>
+            <a:r>
+              <a:rPr lang="en-US" sz="1000" dirty="0" err="1">
+                <a:solidFill>
+                  <a:schemeClr val="bg1">
+                    <a:lumMod val="85000"/>
+                  </a:schemeClr>
+                </a:solidFill>
+              </a:rPr>
+              <a:t>System.Console</a:t>
+            </a:r>
+            <a:r>
+              <a:rPr lang="en-US" sz="1000" dirty="0">
+                <a:solidFill>
+                  <a:schemeClr val="bg1">
+                    <a:lumMod val="85000"/>
+                  </a:schemeClr>
+                </a:solidFill>
+              </a:rPr>
+              <a:t>; namespace Lansoft.CursoCshap8 { static class </a:t>
+            </a:r>
+            <a:r>
+              <a:rPr lang="en-US" sz="1000" dirty="0" err="1">
+                <a:solidFill>
+                  <a:schemeClr val="bg1">
+                    <a:lumMod val="85000"/>
+                  </a:schemeClr>
+                </a:solidFill>
+              </a:rPr>
+              <a:t>Programa</a:t>
+            </a:r>
+            <a:r>
+              <a:rPr lang="en-US" sz="1000" dirty="0">
+                <a:solidFill>
+                  <a:schemeClr val="bg1">
+                    <a:lumMod val="85000"/>
+                  </a:schemeClr>
+                </a:solidFill>
+              </a:rPr>
+              <a:t> { </a:t>
+            </a:r>
+          </a:p>
+          <a:p>
+            <a:endParaRPr lang="en-US" sz="1000" b="1" dirty="0">
+              <a:solidFill>
+                <a:schemeClr val="bg1"/>
+              </a:solidFill>
+            </a:endParaRPr>
+          </a:p>
+          <a:p>
+            <a:r>
+              <a:rPr lang="en-US" sz="1600" b="1" dirty="0"/>
+              <a:t>static void </a:t>
+            </a:r>
+            <a:r>
+              <a:rPr lang="en-US" sz="1600" b="1" dirty="0" err="1"/>
+              <a:t>CuentaRegresiva</a:t>
+            </a:r>
+            <a:r>
+              <a:rPr lang="en-US" sz="1600" b="1" dirty="0"/>
+              <a:t>() {</a:t>
+            </a:r>
+          </a:p>
+          <a:p>
+            <a:r>
+              <a:rPr lang="en-US" sz="1600" b="1" dirty="0"/>
+              <a:t>      var x = 10;</a:t>
+            </a:r>
+          </a:p>
+          <a:p>
+            <a:r>
+              <a:rPr lang="en-US" sz="1600" b="1" dirty="0"/>
+              <a:t>      Recursion(x);</a:t>
+            </a:r>
+          </a:p>
+          <a:p>
+            <a:r>
+              <a:rPr lang="en-US" sz="1600" b="1" dirty="0"/>
+              <a:t>      WriteLine("Go");</a:t>
+            </a:r>
+          </a:p>
+          <a:p>
+            <a:r>
+              <a:rPr lang="en-US" sz="1600" b="1" dirty="0"/>
+              <a:t>		</a:t>
+            </a:r>
+          </a:p>
+          <a:p>
+            <a:r>
+              <a:rPr lang="en-US" sz="1600" b="1" dirty="0"/>
+              <a:t>      void Recursion(int </a:t>
+            </a:r>
+            <a:r>
+              <a:rPr lang="en-US" sz="1600" b="1" dirty="0" err="1"/>
+              <a:t>i</a:t>
+            </a:r>
+            <a:r>
+              <a:rPr lang="en-US" sz="1600" b="1" dirty="0"/>
+              <a:t>) {</a:t>
+            </a:r>
+          </a:p>
+          <a:p>
+            <a:r>
+              <a:rPr lang="en-US" sz="1600" b="1" dirty="0"/>
+              <a:t>            if (</a:t>
+            </a:r>
+            <a:r>
+              <a:rPr lang="en-US" sz="1600" b="1" dirty="0" err="1"/>
+              <a:t>i</a:t>
+            </a:r>
+            <a:r>
+              <a:rPr lang="en-US" sz="1600" b="1" dirty="0"/>
+              <a:t> &lt;= 0) return;</a:t>
+            </a:r>
+          </a:p>
+          <a:p>
+            <a:r>
+              <a:rPr lang="en-US" sz="1600" b="1" dirty="0"/>
+              <a:t>            WriteLine(</a:t>
+            </a:r>
+            <a:r>
+              <a:rPr lang="en-US" sz="1600" b="1" dirty="0" err="1"/>
+              <a:t>i</a:t>
+            </a:r>
+            <a:r>
+              <a:rPr lang="en-US" sz="1600" b="1" dirty="0"/>
+              <a:t>);</a:t>
+            </a:r>
+          </a:p>
+          <a:p>
+            <a:r>
+              <a:rPr lang="en-US" sz="1600" b="1" dirty="0"/>
+              <a:t>            Recursion(</a:t>
+            </a:r>
+            <a:r>
+              <a:rPr lang="en-US" sz="1600" b="1" dirty="0" err="1"/>
+              <a:t>i</a:t>
+            </a:r>
+            <a:r>
+              <a:rPr lang="en-US" sz="1600" b="1" dirty="0"/>
+              <a:t> - 1);</a:t>
+            </a:r>
+          </a:p>
+          <a:p>
+            <a:r>
+              <a:rPr lang="en-US" sz="1600" b="1" dirty="0"/>
+              <a:t>      }</a:t>
+            </a:r>
+          </a:p>
+          <a:p>
+            <a:r>
+              <a:rPr lang="en-US" sz="1600" b="1" dirty="0"/>
+              <a:t>}</a:t>
+            </a:r>
+          </a:p>
+          <a:p>
+            <a:r>
+              <a:rPr lang="en-US" sz="1600" b="1" dirty="0"/>
+              <a:t>static void Main() {</a:t>
+            </a:r>
+          </a:p>
+          <a:p>
+            <a:r>
+              <a:rPr lang="en-US" sz="1600" b="1" dirty="0"/>
+              <a:t>      </a:t>
+            </a:r>
+            <a:r>
+              <a:rPr lang="en-US" sz="1600" b="1" dirty="0" err="1"/>
+              <a:t>CuentaRegresiva</a:t>
+            </a:r>
+            <a:r>
+              <a:rPr lang="en-US" sz="1600" b="1" dirty="0"/>
+              <a:t>();</a:t>
+            </a:r>
+          </a:p>
+          <a:p>
+            <a:r>
+              <a:rPr lang="en-US" sz="1600" b="1" dirty="0"/>
+              <a:t>}</a:t>
+            </a:r>
+          </a:p>
+          <a:p>
+            <a:r>
+              <a:rPr lang="en-US" sz="1400" b="1" dirty="0">
+                <a:solidFill>
+                  <a:schemeClr val="bg1"/>
+                </a:solidFill>
+              </a:rPr>
+              <a:t> </a:t>
+            </a:r>
+            <a:r>
+              <a:rPr lang="en-US" sz="1000" b="1" dirty="0">
+                <a:solidFill>
+                  <a:schemeClr val="bg1"/>
+                </a:solidFill>
+              </a:rPr>
+              <a:t> </a:t>
+            </a:r>
+            <a:r>
+              <a:rPr lang="en-US" sz="1400" b="1" dirty="0">
+                <a:solidFill>
+                  <a:schemeClr val="bg1"/>
+                </a:solidFill>
+              </a:rPr>
+              <a:t>      </a:t>
+            </a:r>
+          </a:p>
+          <a:p>
+            <a:r>
+              <a:rPr lang="en-US" sz="1000" dirty="0">
+                <a:solidFill>
+                  <a:schemeClr val="bg1">
+                    <a:lumMod val="85000"/>
+                  </a:schemeClr>
+                </a:solidFill>
+              </a:rPr>
+              <a:t>}}</a:t>
+            </a:r>
           </a:p>
         </p:txBody>
       </p:sp>
     </p:spTree>
     <p:extLst>
       <p:ext uri="{BB962C8B-B14F-4D97-AF65-F5344CB8AC3E}">
-        <p14:creationId xmlns:p14="http://schemas.microsoft.com/office/powerpoint/2010/main" val="4221202844"/>
+        <p14:creationId xmlns:p14="http://schemas.microsoft.com/office/powerpoint/2010/main" val="3415637826"/>
       </p:ext>
     </p:extLst>
   </p:cSld>
@@ -53245,13 +53892,27 @@
         </p:nvSpPr>
         <p:spPr>
           <a:xfrm>
-            <a:off x="838200" y="1825626"/>
-            <a:ext cx="10515600" cy="1518466"/>
+            <a:off x="7210697" y="2069465"/>
+            <a:ext cx="4143103" cy="4131037"/>
           </a:xfrm>
         </p:spPr>
+        <p:style>
+          <a:lnRef idx="1">
+            <a:schemeClr val="accent5"/>
+          </a:lnRef>
+          <a:fillRef idx="2">
+            <a:schemeClr val="accent5"/>
+          </a:fillRef>
+          <a:effectRef idx="1">
+            <a:schemeClr val="accent5"/>
+          </a:effectRef>
+          <a:fontRef idx="minor">
+            <a:schemeClr val="dk1"/>
+          </a:fontRef>
+        </p:style>
         <p:txBody>
           <a:bodyPr>
-            <a:normAutofit fontScale="85000" lnSpcReduction="10000"/>
+            <a:normAutofit fontScale="92500" lnSpcReduction="10000"/>
           </a:bodyPr>
           <a:lstStyle/>
           <a:p>
@@ -53441,10 +54102,10 @@
       </p:sp>
       <p:sp>
         <p:nvSpPr>
-          <p:cNvPr id="4" name="TextBox 3">
+          <p:cNvPr id="5" name="TextBox 4">
             <a:extLst>
               <a:ext uri="{FF2B5EF4-FFF2-40B4-BE49-F238E27FC236}">
-                <a16:creationId xmlns:a16="http://schemas.microsoft.com/office/drawing/2014/main" id="{02A9E83B-5EEE-F54A-84E8-A029660DF383}"/>
+                <a16:creationId xmlns:a16="http://schemas.microsoft.com/office/drawing/2014/main" id="{6527EAAE-B956-9644-97B3-CD4F2FF1B17C}"/>
               </a:ext>
             </a:extLst>
           </p:cNvPr>
@@ -53453,8 +54114,8 @@
         </p:nvSpPr>
         <p:spPr>
           <a:xfrm>
-            <a:off x="3454037" y="2584859"/>
-            <a:ext cx="5492933" cy="3724096"/>
+            <a:off x="838200" y="2642266"/>
+            <a:ext cx="5492933" cy="2985433"/>
           </a:xfrm>
           <a:prstGeom prst="rect">
             <a:avLst/>
@@ -53541,129 +54202,90 @@
             </a:endParaRPr>
           </a:p>
           <a:p>
-            <a:pPr lvl="1"/>
-            <a:r>
-              <a:rPr lang="en-US" sz="1600" b="1" dirty="0"/>
+            <a:r>
+              <a:rPr lang="en-US" b="1" dirty="0"/>
+              <a:t>static void Set(ref int </a:t>
+            </a:r>
+            <a:r>
+              <a:rPr lang="en-US" b="1" dirty="0" err="1"/>
+              <a:t>i</a:t>
+            </a:r>
+            <a:r>
+              <a:rPr lang="en-US" b="1" dirty="0"/>
+              <a:t>) { </a:t>
+            </a:r>
+            <a:r>
+              <a:rPr lang="en-US" b="1" dirty="0" err="1"/>
+              <a:t>i</a:t>
+            </a:r>
+            <a:r>
+              <a:rPr lang="en-US" b="1" dirty="0"/>
+              <a:t> = 20; }</a:t>
+            </a:r>
+          </a:p>
+          <a:p>
+            <a:endParaRPr lang="en-US" b="1" dirty="0"/>
+          </a:p>
+          <a:p>
+            <a:r>
+              <a:rPr lang="en-US" b="1" dirty="0"/>
               <a:t>static void Main()</a:t>
             </a:r>
           </a:p>
           <a:p>
-            <a:pPr lvl="1"/>
-            <a:r>
-              <a:rPr lang="en-US" sz="1600" b="1" dirty="0"/>
+            <a:r>
+              <a:rPr lang="en-US" b="1" dirty="0"/>
               <a:t>{</a:t>
             </a:r>
           </a:p>
           <a:p>
-            <a:pPr lvl="2"/>
-            <a:r>
-              <a:rPr lang="en-US" sz="1600" b="1" dirty="0"/>
-              <a:t>ref int y = ref </a:t>
-            </a:r>
-            <a:r>
-              <a:rPr lang="en-US" sz="1600" b="1" dirty="0" err="1"/>
-              <a:t>GetField</a:t>
-            </a:r>
-            <a:r>
-              <a:rPr lang="en-US" sz="1600" b="1" dirty="0"/>
-              <a:t>(); 	// reference</a:t>
-            </a:r>
-          </a:p>
-          <a:p>
-            <a:pPr lvl="2"/>
-            <a:r>
-              <a:rPr lang="en-US" sz="1600" b="1" dirty="0"/>
-              <a:t>int </a:t>
-            </a:r>
-            <a:r>
-              <a:rPr lang="en-US" sz="1600" b="1" dirty="0" err="1"/>
-              <a:t>copia</a:t>
-            </a:r>
-            <a:r>
-              <a:rPr lang="en-US" sz="1600" b="1" dirty="0"/>
-              <a:t> = </a:t>
-            </a:r>
-            <a:r>
-              <a:rPr lang="en-US" sz="1600" b="1" dirty="0" err="1"/>
-              <a:t>GetField</a:t>
-            </a:r>
-            <a:r>
-              <a:rPr lang="en-US" sz="1600" b="1" dirty="0"/>
-              <a:t>(); 	// value copy</a:t>
-            </a:r>
-          </a:p>
-          <a:p>
-            <a:pPr lvl="2"/>
-            <a:r>
-              <a:rPr lang="en-US" sz="1600" b="1" dirty="0"/>
-              <a:t>WriteLine(y);</a:t>
-            </a:r>
-          </a:p>
-          <a:p>
-            <a:pPr lvl="2"/>
-            <a:r>
-              <a:rPr lang="en-US" sz="1600" b="1" dirty="0"/>
-              <a:t>WriteLine(</a:t>
-            </a:r>
-            <a:r>
-              <a:rPr lang="en-US" sz="1600" b="1" dirty="0" err="1"/>
-              <a:t>copia</a:t>
-            </a:r>
-            <a:r>
-              <a:rPr lang="en-US" sz="1600" b="1" dirty="0"/>
-              <a:t>);</a:t>
-            </a:r>
-          </a:p>
-          <a:p>
-            <a:pPr lvl="1"/>
-            <a:r>
-              <a:rPr lang="en-US" sz="1600" b="1" dirty="0"/>
+            <a:r>
+              <a:rPr lang="en-US" b="1" dirty="0"/>
+              <a:t>      int x = 10; 		// value type</a:t>
+            </a:r>
+          </a:p>
+          <a:p>
+            <a:r>
+              <a:rPr lang="en-US" b="1" dirty="0"/>
+              <a:t>      Set(ref x);		// pass value of x</a:t>
+            </a:r>
+          </a:p>
+          <a:p>
+            <a:r>
+              <a:rPr lang="en-US" b="1" dirty="0"/>
+              <a:t>      Write($</a:t>
+            </a:r>
+            <a:r>
+              <a:rPr lang="en-US" b="1" dirty="0">
+                <a:solidFill>
+                  <a:schemeClr val="bg1"/>
+                </a:solidFill>
+              </a:rPr>
+              <a:t>"</a:t>
+            </a:r>
+            <a:r>
+              <a:rPr lang="en-US" b="1" dirty="0"/>
+              <a:t> x = {x} </a:t>
+            </a:r>
+            <a:r>
+              <a:rPr lang="en-US" b="1" dirty="0">
+                <a:solidFill>
+                  <a:schemeClr val="bg1"/>
+                </a:solidFill>
+              </a:rPr>
+              <a:t>"</a:t>
+            </a:r>
+            <a:r>
+              <a:rPr lang="en-US" b="1" dirty="0"/>
+              <a:t>); 	// x = 20</a:t>
+            </a:r>
+          </a:p>
+          <a:p>
+            <a:r>
+              <a:rPr lang="en-US" b="1" dirty="0"/>
               <a:t>}</a:t>
             </a:r>
-          </a:p>
-          <a:p>
-            <a:pPr lvl="1"/>
-            <a:r>
-              <a:rPr lang="en-US" sz="1600" b="1" dirty="0"/>
-              <a:t>static ref int </a:t>
-            </a:r>
-            <a:r>
-              <a:rPr lang="en-US" sz="1600" b="1" dirty="0" err="1"/>
-              <a:t>GetField</a:t>
-            </a:r>
-            <a:r>
-              <a:rPr lang="en-US" sz="1600" b="1" dirty="0"/>
-              <a:t>()</a:t>
-            </a:r>
-          </a:p>
-          <a:p>
-            <a:pPr lvl="1"/>
-            <a:r>
-              <a:rPr lang="en-US" sz="1600" b="1" dirty="0"/>
-              <a:t>{</a:t>
-            </a:r>
-          </a:p>
-          <a:p>
-            <a:pPr lvl="1"/>
-            <a:r>
-              <a:rPr lang="en-US" sz="1600" b="1" dirty="0"/>
-              <a:t>	int x = 5;</a:t>
-            </a:r>
-          </a:p>
-          <a:p>
-            <a:pPr lvl="1"/>
-            <a:r>
-              <a:rPr lang="en-US" sz="1600" b="1" dirty="0"/>
-              <a:t>	return ref x;</a:t>
-            </a:r>
-          </a:p>
-          <a:p>
-            <a:pPr lvl="1"/>
-            <a:r>
-              <a:rPr lang="en-US" sz="1600" b="1" dirty="0"/>
-              <a:t>}</a:t>
-            </a:r>
-            <a:endParaRPr lang="en-US" sz="2000" b="1" dirty="0"/>
+            <a:endParaRPr lang="en-US" sz="1400" b="1" dirty="0"/>
           </a:p>
           <a:p>
             <a:r>
@@ -53740,7 +54362,7 @@
           <p:cNvPr id="2" name="Title 1">
             <a:extLst>
               <a:ext uri="{FF2B5EF4-FFF2-40B4-BE49-F238E27FC236}">
-                <a16:creationId xmlns:a16="http://schemas.microsoft.com/office/drawing/2014/main" id="{6BB8FD7D-9AD4-DE4A-A838-2C652CEE9B37}"/>
+                <a16:creationId xmlns:a16="http://schemas.microsoft.com/office/drawing/2014/main" id="{1524BFF8-18D0-5B44-B00E-F38D95CA5071}"/>
               </a:ext>
             </a:extLst>
           </p:cNvPr>
@@ -53758,7 +54380,7 @@
           <a:p>
             <a:r>
               <a:rPr lang="en-BO" dirty="0"/>
-              <a:t>Tipos valor devueltos por referencia</a:t>
+              <a:t>out</a:t>
             </a:r>
           </a:p>
         </p:txBody>
@@ -53768,7 +54390,7 @@
           <p:cNvPr id="3" name="Content Placeholder 2">
             <a:extLst>
               <a:ext uri="{FF2B5EF4-FFF2-40B4-BE49-F238E27FC236}">
-                <a16:creationId xmlns:a16="http://schemas.microsoft.com/office/drawing/2014/main" id="{CB35B815-ECFC-474A-8B39-18B116BB61FB}"/>
+                <a16:creationId xmlns:a16="http://schemas.microsoft.com/office/drawing/2014/main" id="{D3FE2BFD-C14E-734C-91DE-EF1630C5A196}"/>
               </a:ext>
             </a:extLst>
           </p:cNvPr>
@@ -53781,13 +54403,13 @@
         </p:nvSpPr>
         <p:spPr>
           <a:xfrm>
-            <a:off x="838200" y="1825625"/>
-            <a:ext cx="10515600" cy="1603375"/>
+            <a:off x="705394" y="1825626"/>
+            <a:ext cx="10648406" cy="1213666"/>
           </a:xfrm>
         </p:spPr>
         <p:txBody>
           <a:bodyPr>
-            <a:normAutofit fontScale="92500" lnSpcReduction="20000"/>
+            <a:normAutofit fontScale="70000" lnSpcReduction="20000"/>
           </a:bodyPr>
           <a:lstStyle/>
           <a:p>
@@ -53796,35 +54418,35 @@
             </a:pPr>
             <a:r>
               <a:rPr lang="en-US" dirty="0"/>
-              <a:t>Los </a:t>
-            </a:r>
-            <a:r>
-              <a:rPr lang="en-US" dirty="0" err="1"/>
-              <a:t>tipos</a:t>
-            </a:r>
-            <a:r>
-              <a:rPr lang="en-US" dirty="0"/>
-              <a:t> de valor </a:t>
-            </a:r>
-            <a:r>
-              <a:rPr lang="en-US" dirty="0" err="1"/>
-              <a:t>también</a:t>
-            </a:r>
-            <a:r>
-              <a:rPr lang="en-US" dirty="0"/>
-              <a:t> se </a:t>
-            </a:r>
-            <a:r>
-              <a:rPr lang="en-US" dirty="0" err="1"/>
-              <a:t>pueden</a:t>
-            </a:r>
-            <a:r>
-              <a:rPr lang="en-US" dirty="0"/>
-              <a:t> </a:t>
-            </a:r>
-            <a:r>
-              <a:rPr lang="en-US" dirty="0" err="1"/>
-              <a:t>devolver</a:t>
+              <a:t>A </a:t>
+            </a:r>
+            <a:r>
+              <a:rPr lang="en-US" dirty="0" err="1"/>
+              <a:t>veces</a:t>
+            </a:r>
+            <a:r>
+              <a:rPr lang="en-US" dirty="0"/>
+              <a:t> es </a:t>
+            </a:r>
+            <a:r>
+              <a:rPr lang="en-US" dirty="0" err="1"/>
+              <a:t>posible</a:t>
+            </a:r>
+            <a:r>
+              <a:rPr lang="en-US" dirty="0"/>
+              <a:t> que se </a:t>
+            </a:r>
+            <a:r>
+              <a:rPr lang="en-US" dirty="0" err="1"/>
+              <a:t>desee</a:t>
+            </a:r>
+            <a:r>
+              <a:rPr lang="en-US" dirty="0"/>
+              <a:t> pasar una variable no </a:t>
+            </a:r>
+            <a:r>
+              <a:rPr lang="en-US" dirty="0" err="1"/>
+              <a:t>asignada</a:t>
             </a:r>
             <a:r>
               <a:rPr lang="en-US" dirty="0"/>
@@ -53836,19 +54458,75 @@
             </a:r>
             <a:r>
               <a:rPr lang="en-US" dirty="0"/>
-              <a:t>. La palabra clave ref se </a:t>
-            </a:r>
-            <a:r>
-              <a:rPr lang="en-US" dirty="0" err="1"/>
-              <a:t>agrega</a:t>
-            </a:r>
-            <a:r>
-              <a:rPr lang="en-US" dirty="0"/>
-              <a:t> antes del </a:t>
-            </a:r>
-            <a:r>
-              <a:rPr lang="en-US" dirty="0" err="1"/>
-              <a:t>tipo</a:t>
+              <a:t> y que sea </a:t>
+            </a:r>
+            <a:r>
+              <a:rPr lang="en-US" dirty="0" err="1"/>
+              <a:t>asignada</a:t>
+            </a:r>
+            <a:r>
+              <a:rPr lang="en-US" dirty="0"/>
+              <a:t> </a:t>
+            </a:r>
+            <a:r>
+              <a:rPr lang="en-US" dirty="0" err="1"/>
+              <a:t>en</a:t>
+            </a:r>
+            <a:r>
+              <a:rPr lang="en-US" dirty="0"/>
+              <a:t> el </a:t>
+            </a:r>
+            <a:r>
+              <a:rPr lang="en-US" dirty="0" err="1"/>
+              <a:t>método</a:t>
+            </a:r>
+            <a:r>
+              <a:rPr lang="en-US" dirty="0"/>
+              <a:t> </a:t>
+            </a:r>
+            <a:r>
+              <a:rPr lang="en-US" dirty="0" err="1"/>
+              <a:t>invocado</a:t>
+            </a:r>
+            <a:r>
+              <a:rPr lang="en-US" dirty="0"/>
+              <a:t>. Sin embargo, el </a:t>
+            </a:r>
+            <a:r>
+              <a:rPr lang="en-US" dirty="0" err="1"/>
+              <a:t>uso</a:t>
+            </a:r>
+            <a:r>
+              <a:rPr lang="en-US" dirty="0"/>
+              <a:t> de una variable local no </a:t>
+            </a:r>
+            <a:r>
+              <a:rPr lang="en-US" dirty="0" err="1"/>
+              <a:t>asignada</a:t>
+            </a:r>
+            <a:r>
+              <a:rPr lang="en-US" dirty="0"/>
+              <a:t> </a:t>
+            </a:r>
+            <a:r>
+              <a:rPr lang="en-US" dirty="0" err="1"/>
+              <a:t>dará</a:t>
+            </a:r>
+            <a:r>
+              <a:rPr lang="en-US" dirty="0"/>
+              <a:t> un error </a:t>
+            </a:r>
+            <a:r>
+              <a:rPr lang="en-US" dirty="0" err="1"/>
+              <a:t>en</a:t>
+            </a:r>
+            <a:r>
+              <a:rPr lang="en-US" dirty="0"/>
+              <a:t> </a:t>
+            </a:r>
+            <a:r>
+              <a:rPr lang="en-US" dirty="0" err="1"/>
+              <a:t>tiempo</a:t>
             </a:r>
             <a:r>
               <a:rPr lang="en-US" dirty="0"/>
@@ -53856,23 +54534,111 @@
             </a:r>
             <a:r>
               <a:rPr lang="en-US" dirty="0" err="1"/>
-              <a:t>retorno</a:t>
-            </a:r>
-            <a:r>
-              <a:rPr lang="en-US" dirty="0"/>
-              <a:t> y el valor de </a:t>
-            </a:r>
-            <a:r>
-              <a:rPr lang="en-US" dirty="0" err="1"/>
-              <a:t>retorno</a:t>
-            </a:r>
-            <a:r>
-              <a:rPr lang="en-US" dirty="0"/>
-              <a:t>. </a:t>
-            </a:r>
-            <a:r>
-              <a:rPr lang="en-US" dirty="0" err="1"/>
-              <a:t>Tenga</a:t>
+              <a:t>compilación</a:t>
+            </a:r>
+            <a:r>
+              <a:rPr lang="en-US" dirty="0"/>
+              <a:t>. Para </a:t>
+            </a:r>
+            <a:r>
+              <a:rPr lang="en-US" dirty="0" err="1"/>
+              <a:t>esta</a:t>
+            </a:r>
+            <a:r>
+              <a:rPr lang="en-US" dirty="0"/>
+              <a:t> </a:t>
+            </a:r>
+            <a:r>
+              <a:rPr lang="en-US" dirty="0" err="1"/>
+              <a:t>situación</a:t>
+            </a:r>
+            <a:r>
+              <a:rPr lang="en-US" dirty="0"/>
+              <a:t>, se </a:t>
+            </a:r>
+            <a:r>
+              <a:rPr lang="en-US" dirty="0" err="1"/>
+              <a:t>puede</a:t>
+            </a:r>
+            <a:r>
+              <a:rPr lang="en-US" dirty="0"/>
+              <a:t> </a:t>
+            </a:r>
+            <a:r>
+              <a:rPr lang="en-US" dirty="0" err="1"/>
+              <a:t>usar</a:t>
+            </a:r>
+            <a:r>
+              <a:rPr lang="en-US" dirty="0"/>
+              <a:t> la palabra clave out. Tiene la </a:t>
+            </a:r>
+            <a:r>
+              <a:rPr lang="en-US" dirty="0" err="1"/>
+              <a:t>misma</a:t>
+            </a:r>
+            <a:r>
+              <a:rPr lang="en-US" dirty="0"/>
+              <a:t> </a:t>
+            </a:r>
+            <a:r>
+              <a:rPr lang="en-US" dirty="0" err="1"/>
+              <a:t>función</a:t>
+            </a:r>
+            <a:r>
+              <a:rPr lang="en-US" dirty="0"/>
+              <a:t> que ref, </a:t>
+            </a:r>
+            <a:r>
+              <a:rPr lang="en-US" dirty="0" err="1"/>
+              <a:t>excepto</a:t>
+            </a:r>
+            <a:r>
+              <a:rPr lang="en-US" dirty="0"/>
+              <a:t> que el </a:t>
+            </a:r>
+            <a:r>
+              <a:rPr lang="en-US" dirty="0" err="1"/>
+              <a:t>compilador</a:t>
+            </a:r>
+            <a:r>
+              <a:rPr lang="en-US" dirty="0"/>
+              <a:t> </a:t>
+            </a:r>
+            <a:r>
+              <a:rPr lang="en-US" dirty="0" err="1"/>
+              <a:t>permitirá</a:t>
+            </a:r>
+            <a:r>
+              <a:rPr lang="en-US" dirty="0"/>
+              <a:t> el </a:t>
+            </a:r>
+            <a:r>
+              <a:rPr lang="en-US" dirty="0" err="1"/>
+              <a:t>uso</a:t>
+            </a:r>
+            <a:r>
+              <a:rPr lang="en-US" dirty="0"/>
+              <a:t> de la variable no </a:t>
+            </a:r>
+            <a:r>
+              <a:rPr lang="en-US" dirty="0" err="1"/>
+              <a:t>asignada</a:t>
+            </a:r>
+            <a:r>
+              <a:rPr lang="en-US" dirty="0"/>
+              <a:t> y se </a:t>
+            </a:r>
+            <a:r>
+              <a:rPr lang="en-US" dirty="0" err="1"/>
+              <a:t>asegurará</a:t>
+            </a:r>
+            <a:r>
+              <a:rPr lang="en-US" dirty="0"/>
+              <a:t> de que la variable sea </a:t>
+            </a:r>
+            <a:r>
+              <a:rPr lang="en-US" dirty="0" err="1"/>
+              <a:t>asignada</a:t>
             </a:r>
             <a:r>
               <a:rPr lang="en-US" dirty="0"/>
@@ -53884,79 +54650,7 @@
             </a:r>
             <a:r>
               <a:rPr lang="en-US" dirty="0"/>
-              <a:t> </a:t>
-            </a:r>
-            <a:r>
-              <a:rPr lang="en-US" dirty="0" err="1"/>
-              <a:t>cuenta</a:t>
-            </a:r>
-            <a:r>
-              <a:rPr lang="en-US" dirty="0"/>
-              <a:t> que la variable </a:t>
-            </a:r>
-            <a:r>
-              <a:rPr lang="en-US" dirty="0" err="1"/>
-              <a:t>devuelta</a:t>
-            </a:r>
-            <a:r>
-              <a:rPr lang="en-US" dirty="0"/>
-              <a:t> debe </a:t>
-            </a:r>
-            <a:r>
-              <a:rPr lang="en-US" dirty="0" err="1"/>
-              <a:t>tener</a:t>
-            </a:r>
-            <a:r>
-              <a:rPr lang="en-US" dirty="0"/>
-              <a:t> una </a:t>
-            </a:r>
-            <a:r>
-              <a:rPr lang="en-US" dirty="0" err="1"/>
-              <a:t>vida</a:t>
-            </a:r>
-            <a:r>
-              <a:rPr lang="en-US" dirty="0"/>
-              <a:t> </a:t>
-            </a:r>
-            <a:r>
-              <a:rPr lang="en-US" dirty="0" err="1"/>
-              <a:t>útil</a:t>
-            </a:r>
-            <a:r>
-              <a:rPr lang="en-US" dirty="0"/>
-              <a:t> que se </a:t>
-            </a:r>
-            <a:r>
-              <a:rPr lang="en-US" dirty="0" err="1"/>
-              <a:t>extienda</a:t>
-            </a:r>
-            <a:r>
-              <a:rPr lang="en-US" dirty="0"/>
-              <a:t> </a:t>
-            </a:r>
-            <a:r>
-              <a:rPr lang="en-US" dirty="0" err="1"/>
-              <a:t>más</a:t>
-            </a:r>
-            <a:r>
-              <a:rPr lang="en-US" dirty="0"/>
-              <a:t> </a:t>
-            </a:r>
-            <a:r>
-              <a:rPr lang="en-US" dirty="0" err="1"/>
-              <a:t>allá</a:t>
-            </a:r>
-            <a:r>
-              <a:rPr lang="en-US" dirty="0"/>
-              <a:t> del </a:t>
-            </a:r>
-            <a:r>
-              <a:rPr lang="en-US" dirty="0" err="1"/>
-              <a:t>alcance</a:t>
-            </a:r>
-            <a:r>
-              <a:rPr lang="en-US" dirty="0"/>
-              <a:t> del </a:t>
+              <a:t> el </a:t>
             </a:r>
             <a:r>
               <a:rPr lang="en-US" dirty="0" err="1"/>
@@ -53964,32 +54658,251 @@
             </a:r>
             <a:r>
               <a:rPr lang="en-US" dirty="0"/>
-              <a:t>, por lo que no </a:t>
-            </a:r>
-            <a:r>
-              <a:rPr lang="en-US" dirty="0" err="1"/>
-              <a:t>puede</a:t>
-            </a:r>
-            <a:r>
-              <a:rPr lang="en-US" dirty="0"/>
-              <a:t> ser una variable local para el </a:t>
-            </a:r>
-            <a:r>
-              <a:rPr lang="en-US" dirty="0" err="1"/>
-              <a:t>método</a:t>
+              <a:t> </a:t>
+            </a:r>
+            <a:r>
+              <a:rPr lang="en-US" dirty="0" err="1"/>
+              <a:t>invocado</a:t>
             </a:r>
             <a:r>
               <a:rPr lang="en-US" dirty="0"/>
               <a:t>.</a:t>
             </a:r>
             <a:endParaRPr lang="en-BO" dirty="0"/>
+          </a:p>
+        </p:txBody>
+      </p:sp>
+      <p:sp>
+        <p:nvSpPr>
+          <p:cNvPr id="5" name="TextBox 4">
+            <a:extLst>
+              <a:ext uri="{FF2B5EF4-FFF2-40B4-BE49-F238E27FC236}">
+                <a16:creationId xmlns:a16="http://schemas.microsoft.com/office/drawing/2014/main" id="{6A2C397C-3BDB-064D-B780-B9DE9B2271E3}"/>
+              </a:ext>
+            </a:extLst>
+          </p:cNvPr>
+          <p:cNvSpPr txBox="1"/>
+          <p:nvPr/>
+        </p:nvSpPr>
+        <p:spPr>
+          <a:xfrm>
+            <a:off x="3349533" y="3324498"/>
+            <a:ext cx="5492933" cy="2985433"/>
+          </a:xfrm>
+          <a:prstGeom prst="rect">
+            <a:avLst/>
+          </a:prstGeom>
+        </p:spPr>
+        <p:style>
+          <a:lnRef idx="2">
+            <a:schemeClr val="accent1">
+              <a:shade val="50000"/>
+            </a:schemeClr>
+          </a:lnRef>
+          <a:fillRef idx="1">
+            <a:schemeClr val="accent1"/>
+          </a:fillRef>
+          <a:effectRef idx="0">
+            <a:schemeClr val="accent1"/>
+          </a:effectRef>
+          <a:fontRef idx="minor">
+            <a:schemeClr val="lt1"/>
+          </a:fontRef>
+        </p:style>
+        <p:txBody>
+          <a:bodyPr wrap="square" rtlCol="0">
+            <a:spAutoFit/>
+          </a:bodyPr>
+          <a:lstStyle/>
+          <a:p>
+            <a:r>
+              <a:rPr lang="en-US" sz="1000" dirty="0">
+                <a:solidFill>
+                  <a:schemeClr val="bg1">
+                    <a:lumMod val="85000"/>
+                  </a:schemeClr>
+                </a:solidFill>
+              </a:rPr>
+              <a:t>using System; using static </a:t>
+            </a:r>
+            <a:r>
+              <a:rPr lang="en-US" sz="1000" dirty="0" err="1">
+                <a:solidFill>
+                  <a:schemeClr val="bg1">
+                    <a:lumMod val="85000"/>
+                  </a:schemeClr>
+                </a:solidFill>
+              </a:rPr>
+              <a:t>System.Console</a:t>
+            </a:r>
+            <a:r>
+              <a:rPr lang="en-US" sz="1000" dirty="0">
+                <a:solidFill>
+                  <a:schemeClr val="bg1">
+                    <a:lumMod val="85000"/>
+                  </a:schemeClr>
+                </a:solidFill>
+              </a:rPr>
+              <a:t>; namespace Lansoft.CursoCshap8 { static class </a:t>
+            </a:r>
+            <a:r>
+              <a:rPr lang="en-US" sz="1000" dirty="0" err="1">
+                <a:solidFill>
+                  <a:schemeClr val="bg1">
+                    <a:lumMod val="85000"/>
+                  </a:schemeClr>
+                </a:solidFill>
+              </a:rPr>
+              <a:t>Programa</a:t>
+            </a:r>
+            <a:r>
+              <a:rPr lang="en-US" sz="1000" dirty="0">
+                <a:solidFill>
+                  <a:schemeClr val="bg1">
+                    <a:lumMod val="85000"/>
+                  </a:schemeClr>
+                </a:solidFill>
+              </a:rPr>
+              <a:t> { </a:t>
+            </a:r>
+          </a:p>
+          <a:p>
+            <a:endParaRPr lang="en-US" sz="1000" b="1" dirty="0">
+              <a:solidFill>
+                <a:schemeClr val="bg1"/>
+              </a:solidFill>
+            </a:endParaRPr>
+          </a:p>
+          <a:p>
+            <a:r>
+              <a:rPr lang="en-US" b="1" dirty="0"/>
+              <a:t>static void Set(out int </a:t>
+            </a:r>
+            <a:r>
+              <a:rPr lang="en-US" b="1" dirty="0" err="1"/>
+              <a:t>i</a:t>
+            </a:r>
+            <a:r>
+              <a:rPr lang="en-US" b="1" dirty="0"/>
+              <a:t>) { </a:t>
+            </a:r>
+            <a:r>
+              <a:rPr lang="en-US" b="1" dirty="0" err="1"/>
+              <a:t>i</a:t>
+            </a:r>
+            <a:r>
+              <a:rPr lang="en-US" b="1" dirty="0"/>
+              <a:t> = 20; }</a:t>
+            </a:r>
+          </a:p>
+          <a:p>
+            <a:endParaRPr lang="en-US" b="1" dirty="0"/>
+          </a:p>
+          <a:p>
+            <a:r>
+              <a:rPr lang="en-US" b="1" dirty="0"/>
+              <a:t>static void Main()</a:t>
+            </a:r>
+          </a:p>
+          <a:p>
+            <a:r>
+              <a:rPr lang="en-US" b="1" dirty="0"/>
+              <a:t>{</a:t>
+            </a:r>
+          </a:p>
+          <a:p>
+            <a:r>
+              <a:rPr lang="en-US" b="1" dirty="0"/>
+              <a:t>      int x; 			// value type</a:t>
+            </a:r>
+          </a:p>
+          <a:p>
+            <a:r>
+              <a:rPr lang="en-US" b="1" dirty="0"/>
+              <a:t>      Set(out x);		// pass value of x</a:t>
+            </a:r>
+          </a:p>
+          <a:p>
+            <a:r>
+              <a:rPr lang="en-US" b="1" dirty="0"/>
+              <a:t>      Write($</a:t>
+            </a:r>
+            <a:r>
+              <a:rPr lang="en-US" b="1" dirty="0">
+                <a:solidFill>
+                  <a:schemeClr val="bg1"/>
+                </a:solidFill>
+              </a:rPr>
+              <a:t>"</a:t>
+            </a:r>
+            <a:r>
+              <a:rPr lang="en-US" b="1" dirty="0"/>
+              <a:t> x = {x} </a:t>
+            </a:r>
+            <a:r>
+              <a:rPr lang="en-US" b="1" dirty="0">
+                <a:solidFill>
+                  <a:schemeClr val="bg1"/>
+                </a:solidFill>
+              </a:rPr>
+              <a:t>"</a:t>
+            </a:r>
+            <a:r>
+              <a:rPr lang="en-US" b="1" dirty="0"/>
+              <a:t>); 	// x = 20</a:t>
+            </a:r>
+          </a:p>
+          <a:p>
+            <a:r>
+              <a:rPr lang="en-US" b="1" dirty="0"/>
+              <a:t>}</a:t>
+            </a:r>
+            <a:endParaRPr lang="en-US" sz="1400" b="1" dirty="0"/>
+          </a:p>
+          <a:p>
+            <a:r>
+              <a:rPr lang="en-US" sz="1400" b="1" dirty="0">
+                <a:solidFill>
+                  <a:schemeClr val="bg1"/>
+                </a:solidFill>
+              </a:rPr>
+              <a:t> </a:t>
+            </a:r>
+            <a:r>
+              <a:rPr lang="en-US" sz="1000" b="1" dirty="0">
+                <a:solidFill>
+                  <a:schemeClr val="bg1"/>
+                </a:solidFill>
+              </a:rPr>
+              <a:t> </a:t>
+            </a:r>
+            <a:r>
+              <a:rPr lang="en-US" sz="1400" b="1" dirty="0">
+                <a:solidFill>
+                  <a:schemeClr val="bg1"/>
+                </a:solidFill>
+              </a:rPr>
+              <a:t>      </a:t>
+            </a:r>
+          </a:p>
+          <a:p>
+            <a:r>
+              <a:rPr lang="en-US" sz="1000" dirty="0">
+                <a:solidFill>
+                  <a:schemeClr val="bg1">
+                    <a:lumMod val="85000"/>
+                  </a:schemeClr>
+                </a:solidFill>
+              </a:rPr>
+              <a:t>}}</a:t>
+            </a:r>
           </a:p>
         </p:txBody>
       </p:sp>
     </p:spTree>
     <p:extLst>
       <p:ext uri="{BB962C8B-B14F-4D97-AF65-F5344CB8AC3E}">
-        <p14:creationId xmlns:p14="http://schemas.microsoft.com/office/powerpoint/2010/main" val="2007582356"/>
+        <p14:creationId xmlns:p14="http://schemas.microsoft.com/office/powerpoint/2010/main" val="460735052"/>
       </p:ext>
     </p:extLst>
   </p:cSld>
@@ -54021,7 +54934,7 @@
           <p:cNvPr id="2" name="Title 1">
             <a:extLst>
               <a:ext uri="{FF2B5EF4-FFF2-40B4-BE49-F238E27FC236}">
-                <a16:creationId xmlns:a16="http://schemas.microsoft.com/office/drawing/2014/main" id="{1524BFF8-18D0-5B44-B00E-F38D95CA5071}"/>
+                <a16:creationId xmlns:a16="http://schemas.microsoft.com/office/drawing/2014/main" id="{75F394D0-A645-C446-A07D-8022F1152D16}"/>
               </a:ext>
             </a:extLst>
           </p:cNvPr>
@@ -54034,13 +54947,16 @@
         </p:nvSpPr>
         <p:spPr/>
         <p:txBody>
-          <a:bodyPr/>
+          <a:bodyPr>
+            <a:normAutofit/>
+          </a:bodyPr>
           <a:lstStyle/>
           <a:p>
             <a:r>
-              <a:rPr lang="en-BO" dirty="0"/>
-              <a:t>out</a:t>
-            </a:r>
+              <a:rPr lang="en-BO" sz="4000" dirty="0"/>
+              <a:t>Declarando variable out en el argumento</a:t>
+            </a:r>
+            <a:endParaRPr lang="en-BO" sz="4800" dirty="0"/>
           </a:p>
         </p:txBody>
       </p:sp>
@@ -54049,7 +54965,7 @@
           <p:cNvPr id="3" name="Content Placeholder 2">
             <a:extLst>
               <a:ext uri="{FF2B5EF4-FFF2-40B4-BE49-F238E27FC236}">
-                <a16:creationId xmlns:a16="http://schemas.microsoft.com/office/drawing/2014/main" id="{D3FE2BFD-C14E-734C-91DE-EF1630C5A196}"/>
+                <a16:creationId xmlns:a16="http://schemas.microsoft.com/office/drawing/2014/main" id="{7455A23F-1C34-8341-8BF7-6AA34E8A54CF}"/>
               </a:ext>
             </a:extLst>
           </p:cNvPr>
@@ -54060,19 +54976,382 @@
             <p:ph idx="1"/>
           </p:nvPr>
         </p:nvSpPr>
-        <p:spPr/>
+        <p:spPr>
+          <a:xfrm>
+            <a:off x="838200" y="1825625"/>
+            <a:ext cx="10515600" cy="1100455"/>
+          </a:xfrm>
+        </p:spPr>
         <p:txBody>
-          <a:bodyPr/>
+          <a:bodyPr>
+            <a:normAutofit fontScale="92500" lnSpcReduction="10000"/>
+          </a:bodyPr>
           <a:lstStyle/>
           <a:p>
-            <a:endParaRPr lang="en-BO"/>
+            <a:pPr marL="0" indent="0">
+              <a:buNone/>
+            </a:pPr>
+            <a:r>
+              <a:rPr lang="en-US" dirty="0"/>
+              <a:t>Es </a:t>
+            </a:r>
+            <a:r>
+              <a:rPr lang="en-US" dirty="0" err="1"/>
+              <a:t>posible</a:t>
+            </a:r>
+            <a:r>
+              <a:rPr lang="en-US" dirty="0"/>
+              <a:t> </a:t>
+            </a:r>
+            <a:r>
+              <a:rPr lang="en-US" dirty="0" err="1"/>
+              <a:t>declarar</a:t>
+            </a:r>
+            <a:r>
+              <a:rPr lang="en-US" dirty="0"/>
+              <a:t> variables </a:t>
+            </a:r>
+            <a:r>
+              <a:rPr lang="en-US" dirty="0" err="1"/>
+              <a:t>en</a:t>
+            </a:r>
+            <a:r>
+              <a:rPr lang="en-US" dirty="0"/>
+              <a:t> la </a:t>
+            </a:r>
+            <a:r>
+              <a:rPr lang="en-US" dirty="0" err="1"/>
+              <a:t>lista</a:t>
+            </a:r>
+            <a:r>
+              <a:rPr lang="en-US" dirty="0"/>
+              <a:t> de </a:t>
+            </a:r>
+            <a:r>
+              <a:rPr lang="en-US" dirty="0" err="1"/>
+              <a:t>argumentos</a:t>
+            </a:r>
+            <a:r>
+              <a:rPr lang="en-US" dirty="0"/>
+              <a:t> de una </a:t>
+            </a:r>
+            <a:r>
+              <a:rPr lang="en-US" dirty="0" err="1"/>
+              <a:t>invocación</a:t>
+            </a:r>
+            <a:r>
+              <a:rPr lang="en-US" dirty="0"/>
+              <a:t> a un </a:t>
+            </a:r>
+            <a:r>
+              <a:rPr lang="en-US" dirty="0" err="1"/>
+              <a:t>método</a:t>
+            </a:r>
+            <a:r>
+              <a:rPr lang="en-US" dirty="0"/>
+              <a:t> que </a:t>
+            </a:r>
+            <a:r>
+              <a:rPr lang="en-US" dirty="0" err="1"/>
+              <a:t>tiene</a:t>
+            </a:r>
+            <a:r>
+              <a:rPr lang="en-US" dirty="0"/>
+              <a:t> </a:t>
+            </a:r>
+            <a:r>
+              <a:rPr lang="en-US" dirty="0" err="1"/>
+              <a:t>parámetros</a:t>
+            </a:r>
+            <a:r>
+              <a:rPr lang="en-US" dirty="0"/>
+              <a:t> out. </a:t>
+            </a:r>
+            <a:r>
+              <a:rPr lang="en-US" dirty="0" err="1"/>
+              <a:t>Esta</a:t>
+            </a:r>
+            <a:r>
+              <a:rPr lang="en-US" dirty="0"/>
+              <a:t> </a:t>
+            </a:r>
+            <a:r>
+              <a:rPr lang="en-US" dirty="0" err="1"/>
+              <a:t>característica</a:t>
+            </a:r>
+            <a:r>
+              <a:rPr lang="en-US" dirty="0"/>
+              <a:t> </a:t>
+            </a:r>
+            <a:r>
+              <a:rPr lang="en-US" dirty="0" err="1"/>
+              <a:t>permite</a:t>
+            </a:r>
+            <a:r>
+              <a:rPr lang="en-US" dirty="0"/>
+              <a:t> que el </a:t>
+            </a:r>
+            <a:r>
+              <a:rPr lang="en-US" dirty="0" err="1"/>
+              <a:t>ejemplo</a:t>
+            </a:r>
+            <a:r>
+              <a:rPr lang="en-US" dirty="0"/>
+              <a:t> anterior se </a:t>
+            </a:r>
+            <a:r>
+              <a:rPr lang="en-US" dirty="0" err="1"/>
+              <a:t>simplifique</a:t>
+            </a:r>
+            <a:r>
+              <a:rPr lang="en-US" dirty="0"/>
+              <a:t> de la </a:t>
+            </a:r>
+            <a:r>
+              <a:rPr lang="en-US" dirty="0" err="1"/>
+              <a:t>siguiente</a:t>
+            </a:r>
+            <a:r>
+              <a:rPr lang="en-US" dirty="0"/>
+              <a:t> </a:t>
+            </a:r>
+            <a:r>
+              <a:rPr lang="en-US" dirty="0" err="1"/>
+              <a:t>manera</a:t>
+            </a:r>
+            <a:r>
+              <a:rPr lang="en-US" dirty="0"/>
+              <a:t>.</a:t>
+            </a:r>
+            <a:endParaRPr lang="en-BO" dirty="0"/>
+          </a:p>
+        </p:txBody>
+      </p:sp>
+      <p:sp>
+        <p:nvSpPr>
+          <p:cNvPr id="4" name="TextBox 3">
+            <a:extLst>
+              <a:ext uri="{FF2B5EF4-FFF2-40B4-BE49-F238E27FC236}">
+                <a16:creationId xmlns:a16="http://schemas.microsoft.com/office/drawing/2014/main" id="{BB5E32F9-9920-E04E-AC79-ECA97FF7EB53}"/>
+              </a:ext>
+            </a:extLst>
+          </p:cNvPr>
+          <p:cNvSpPr txBox="1"/>
+          <p:nvPr/>
+        </p:nvSpPr>
+        <p:spPr>
+          <a:xfrm>
+            <a:off x="3349533" y="3324498"/>
+            <a:ext cx="5492933" cy="2708434"/>
+          </a:xfrm>
+          <a:prstGeom prst="rect">
+            <a:avLst/>
+          </a:prstGeom>
+        </p:spPr>
+        <p:style>
+          <a:lnRef idx="2">
+            <a:schemeClr val="accent1">
+              <a:shade val="50000"/>
+            </a:schemeClr>
+          </a:lnRef>
+          <a:fillRef idx="1">
+            <a:schemeClr val="accent1"/>
+          </a:fillRef>
+          <a:effectRef idx="0">
+            <a:schemeClr val="accent1"/>
+          </a:effectRef>
+          <a:fontRef idx="minor">
+            <a:schemeClr val="lt1"/>
+          </a:fontRef>
+        </p:style>
+        <p:txBody>
+          <a:bodyPr wrap="square" rtlCol="0">
+            <a:spAutoFit/>
+          </a:bodyPr>
+          <a:lstStyle/>
+          <a:p>
+            <a:r>
+              <a:rPr lang="en-US" sz="1000" dirty="0">
+                <a:solidFill>
+                  <a:schemeClr val="bg1">
+                    <a:lumMod val="85000"/>
+                  </a:schemeClr>
+                </a:solidFill>
+              </a:rPr>
+              <a:t>using System; using static </a:t>
+            </a:r>
+            <a:r>
+              <a:rPr lang="en-US" sz="1000" dirty="0" err="1">
+                <a:solidFill>
+                  <a:schemeClr val="bg1">
+                    <a:lumMod val="85000"/>
+                  </a:schemeClr>
+                </a:solidFill>
+              </a:rPr>
+              <a:t>System.Console</a:t>
+            </a:r>
+            <a:r>
+              <a:rPr lang="en-US" sz="1000" dirty="0">
+                <a:solidFill>
+                  <a:schemeClr val="bg1">
+                    <a:lumMod val="85000"/>
+                  </a:schemeClr>
+                </a:solidFill>
+              </a:rPr>
+              <a:t>; namespace Lansoft.CursoCshap8 { static class </a:t>
+            </a:r>
+            <a:r>
+              <a:rPr lang="en-US" sz="1000" dirty="0" err="1">
+                <a:solidFill>
+                  <a:schemeClr val="bg1">
+                    <a:lumMod val="85000"/>
+                  </a:schemeClr>
+                </a:solidFill>
+              </a:rPr>
+              <a:t>Programa</a:t>
+            </a:r>
+            <a:r>
+              <a:rPr lang="en-US" sz="1000" dirty="0">
+                <a:solidFill>
+                  <a:schemeClr val="bg1">
+                    <a:lumMod val="85000"/>
+                  </a:schemeClr>
+                </a:solidFill>
+              </a:rPr>
+              <a:t> { </a:t>
+            </a:r>
+          </a:p>
+          <a:p>
+            <a:endParaRPr lang="en-US" sz="1000" b="1" dirty="0">
+              <a:solidFill>
+                <a:schemeClr val="bg1"/>
+              </a:solidFill>
+            </a:endParaRPr>
+          </a:p>
+          <a:p>
+            <a:r>
+              <a:rPr lang="en-US" b="1" dirty="0"/>
+              <a:t>static void Set(out int </a:t>
+            </a:r>
+            <a:r>
+              <a:rPr lang="en-US" b="1" dirty="0" err="1"/>
+              <a:t>i</a:t>
+            </a:r>
+            <a:r>
+              <a:rPr lang="en-US" b="1" dirty="0"/>
+              <a:t>) { </a:t>
+            </a:r>
+            <a:r>
+              <a:rPr lang="en-US" b="1" dirty="0" err="1"/>
+              <a:t>i</a:t>
+            </a:r>
+            <a:r>
+              <a:rPr lang="en-US" b="1" dirty="0"/>
+              <a:t> = 20; }</a:t>
+            </a:r>
+          </a:p>
+          <a:p>
+            <a:endParaRPr lang="en-US" b="1" dirty="0"/>
+          </a:p>
+          <a:p>
+            <a:r>
+              <a:rPr lang="en-US" b="1" dirty="0"/>
+              <a:t>static void Main()</a:t>
+            </a:r>
+          </a:p>
+          <a:p>
+            <a:r>
+              <a:rPr lang="en-US" b="1" dirty="0"/>
+              <a:t>{</a:t>
+            </a:r>
+          </a:p>
+          <a:p>
+            <a:r>
+              <a:rPr lang="en-US" b="1" dirty="0"/>
+              <a:t>      Set(out int x);		// pass value of x</a:t>
+            </a:r>
+          </a:p>
+          <a:p>
+            <a:r>
+              <a:rPr lang="en-US" b="1" dirty="0"/>
+              <a:t>      Write($</a:t>
+            </a:r>
+            <a:r>
+              <a:rPr lang="en-US" b="1" dirty="0">
+                <a:solidFill>
+                  <a:schemeClr val="bg1"/>
+                </a:solidFill>
+              </a:rPr>
+              <a:t>"</a:t>
+            </a:r>
+            <a:r>
+              <a:rPr lang="en-US" b="1" dirty="0"/>
+              <a:t> x = {x} </a:t>
+            </a:r>
+            <a:r>
+              <a:rPr lang="en-US" b="1" dirty="0">
+                <a:solidFill>
+                  <a:schemeClr val="bg1"/>
+                </a:solidFill>
+              </a:rPr>
+              <a:t>"</a:t>
+            </a:r>
+            <a:r>
+              <a:rPr lang="en-US" b="1" dirty="0"/>
+              <a:t>); 	// x = 20</a:t>
+            </a:r>
+          </a:p>
+          <a:p>
+            <a:r>
+              <a:rPr lang="en-US" b="1" dirty="0"/>
+              <a:t>}</a:t>
+            </a:r>
+            <a:endParaRPr lang="en-US" sz="1400" b="1" dirty="0"/>
+          </a:p>
+          <a:p>
+            <a:r>
+              <a:rPr lang="en-US" sz="1400" b="1" dirty="0">
+                <a:solidFill>
+                  <a:schemeClr val="bg1"/>
+                </a:solidFill>
+              </a:rPr>
+              <a:t> </a:t>
+            </a:r>
+            <a:r>
+              <a:rPr lang="en-US" sz="1000" b="1" dirty="0">
+                <a:solidFill>
+                  <a:schemeClr val="bg1"/>
+                </a:solidFill>
+              </a:rPr>
+              <a:t> </a:t>
+            </a:r>
+            <a:r>
+              <a:rPr lang="en-US" sz="1400" b="1" dirty="0">
+                <a:solidFill>
+                  <a:schemeClr val="bg1"/>
+                </a:solidFill>
+              </a:rPr>
+              <a:t>      </a:t>
+            </a:r>
+          </a:p>
+          <a:p>
+            <a:r>
+              <a:rPr lang="en-US" sz="1000" dirty="0">
+                <a:solidFill>
+                  <a:schemeClr val="bg1">
+                    <a:lumMod val="85000"/>
+                  </a:schemeClr>
+                </a:solidFill>
+              </a:rPr>
+              <a:t>}}</a:t>
+            </a:r>
           </a:p>
         </p:txBody>
       </p:sp>
     </p:spTree>
     <p:extLst>
       <p:ext uri="{BB962C8B-B14F-4D97-AF65-F5344CB8AC3E}">
-        <p14:creationId xmlns:p14="http://schemas.microsoft.com/office/powerpoint/2010/main" val="460735052"/>
+        <p14:creationId xmlns:p14="http://schemas.microsoft.com/office/powerpoint/2010/main" val="4221202844"/>
       </p:ext>
     </p:extLst>
   </p:cSld>

</xml_diff>